<commit_message>
Check for updates functionality added
COMPARE WINS will now check github on launch and look at the most recent release tag. If this tag corresponds to a version later than current, show a message to the user on startup with link to download.
</commit_message>
<xml_diff>
--- a/figures.pptx
+++ b/figures.pptx
@@ -3395,9 +3395,7 @@
               <a:schemeClr val="bg1"/>
             </a:solidFill>
             <a:ln>
-              <a:solidFill>
-                <a:schemeClr val="tx1"/>
-              </a:solidFill>
+              <a:noFill/>
             </a:ln>
           </p:spPr>
           <p:style>
@@ -7777,9 +7775,7 @@
               <a:schemeClr val="bg1"/>
             </a:solidFill>
             <a:ln>
-              <a:solidFill>
-                <a:schemeClr val="tx1"/>
-              </a:solidFill>
+              <a:noFill/>
             </a:ln>
           </p:spPr>
           <p:style>

</xml_diff>